<commit_message>
Added some comments to the security principles.
</commit_message>
<xml_diff>
--- a/slides/2_Basic_Principles_and_Resources.pptx
+++ b/slides/2_Basic_Principles_and_Resources.pptx
@@ -129,13 +129,29 @@
 <file path=ppt/revisionInfo.xml><?xml version="1.0" encoding="utf-8"?>
 <p1510:revInfo xmlns:a="http://schemas.openxmlformats.org/drawingml/2006/main" xmlns:r="http://schemas.openxmlformats.org/officeDocument/2006/relationships" xmlns:p1510="http://schemas.microsoft.com/office/powerpoint/2015/10/main">
   <p1510:revLst>
-    <p1510:client id="{3ED6F2CB-A331-4D07-A8D8-4033E30200D3}" v="120" dt="2020-11-18T16:16:00.227"/>
+    <p1510:client id="{2D404540-AFFE-4CC5-BC81-AA7E0252D251}" v="1" dt="2021-02-18T19:43:32.212"/>
   </p1510:revLst>
 </p1510:revInfo>
 </file>
 
 <file path=ppt/changesInfos/changesInfo1.xml><?xml version="1.0" encoding="utf-8"?>
 <pc:chgInfo xmlns:a="http://schemas.openxmlformats.org/drawingml/2006/main" xmlns:r="http://schemas.openxmlformats.org/officeDocument/2006/relationships" xmlns:ac="http://schemas.microsoft.com/office/drawing/2013/main/command" xmlns:pc="http://schemas.microsoft.com/office/powerpoint/2013/main/command">
+  <pc:docChgLst>
+    <pc:chgData name="Daniel Schwarz" userId="5bb35bb8-905a-4742-88d9-33d9089732e7" providerId="ADAL" clId="{2D404540-AFFE-4CC5-BC81-AA7E0252D251}"/>
+    <pc:docChg chg="modSld">
+      <pc:chgData name="Daniel Schwarz" userId="5bb35bb8-905a-4742-88d9-33d9089732e7" providerId="ADAL" clId="{2D404540-AFFE-4CC5-BC81-AA7E0252D251}" dt="2021-02-18T19:55:34.870" v="659" actId="20577"/>
+      <pc:docMkLst>
+        <pc:docMk/>
+      </pc:docMkLst>
+      <pc:sldChg chg="modNotesTx">
+        <pc:chgData name="Daniel Schwarz" userId="5bb35bb8-905a-4742-88d9-33d9089732e7" providerId="ADAL" clId="{2D404540-AFFE-4CC5-BC81-AA7E0252D251}" dt="2021-02-18T19:55:34.870" v="659" actId="20577"/>
+        <pc:sldMkLst>
+          <pc:docMk/>
+          <pc:sldMk cId="3756812701" sldId="294"/>
+        </pc:sldMkLst>
+      </pc:sldChg>
+    </pc:docChg>
+  </pc:docChgLst>
   <pc:docChgLst>
     <pc:chgData name="Daniel Schwarz" userId="5bb35bb8-905a-4742-88d9-33d9089732e7" providerId="ADAL" clId="{3ED6F2CB-A331-4D07-A8D8-4033E30200D3}"/>
     <pc:docChg chg="undo redo custSel addSld delSld modSld">
@@ -11361,7 +11377,7 @@
           <a:p>
             <a:fld id="{E9A67217-929B-4143-94A9-94A0B9892952}" type="datetimeFigureOut">
               <a:rPr lang="de-AT" smtClean="0"/>
-              <a:t>18.11.2020</a:t>
+              <a:t>18.02.2021</a:t>
             </a:fld>
             <a:endParaRPr lang="de-AT"/>
           </a:p>
@@ -11687,6 +11703,554 @@
           <a:p>
             <a:endParaRPr lang="de-AT" dirty="0"/>
           </a:p>
+          <a:p>
+            <a:r>
+              <a:rPr lang="de-AT" dirty="0" err="1"/>
+              <a:t>EoM</a:t>
+            </a:r>
+            <a:r>
+              <a:rPr lang="de-AT" dirty="0"/>
+              <a:t>: KISS</a:t>
+            </a:r>
+          </a:p>
+          <a:p>
+            <a:endParaRPr lang="de-AT" dirty="0"/>
+          </a:p>
+          <a:p>
+            <a:r>
+              <a:rPr lang="de-AT" dirty="0" err="1"/>
+              <a:t>FsD</a:t>
+            </a:r>
+            <a:r>
+              <a:rPr lang="de-AT" dirty="0"/>
+              <a:t>: </a:t>
+            </a:r>
+            <a:r>
+              <a:rPr lang="en-US" b="0" i="0" dirty="0">
+                <a:solidFill>
+                  <a:srgbClr val="22222A"/>
+                </a:solidFill>
+                <a:effectLst/>
+                <a:latin typeface="Roboto"/>
+              </a:rPr>
+              <a:t>Base access decisions on permission rather than exclusion. </a:t>
+            </a:r>
+            <a:r>
+              <a:rPr lang="en-US" b="0" i="0" dirty="0" err="1">
+                <a:solidFill>
+                  <a:srgbClr val="22222A"/>
+                </a:solidFill>
+                <a:effectLst/>
+                <a:latin typeface="Roboto"/>
+              </a:rPr>
+              <a:t>Damit</a:t>
+            </a:r>
+            <a:r>
+              <a:rPr lang="en-US" b="0" i="0" dirty="0">
+                <a:solidFill>
+                  <a:srgbClr val="22222A"/>
+                </a:solidFill>
+                <a:effectLst/>
+                <a:latin typeface="Roboto"/>
+              </a:rPr>
+              <a:t> </a:t>
+            </a:r>
+            <a:r>
+              <a:rPr lang="en-US" b="0" i="0" dirty="0" err="1">
+                <a:solidFill>
+                  <a:srgbClr val="22222A"/>
+                </a:solidFill>
+                <a:effectLst/>
+                <a:latin typeface="Roboto"/>
+              </a:rPr>
+              <a:t>rechnen</a:t>
+            </a:r>
+            <a:r>
+              <a:rPr lang="en-US" b="0" i="0" dirty="0">
+                <a:solidFill>
+                  <a:srgbClr val="22222A"/>
+                </a:solidFill>
+                <a:effectLst/>
+                <a:latin typeface="Roboto"/>
+              </a:rPr>
+              <a:t>, </a:t>
+            </a:r>
+            <a:r>
+              <a:rPr lang="en-US" b="0" i="0" dirty="0" err="1">
+                <a:solidFill>
+                  <a:srgbClr val="22222A"/>
+                </a:solidFill>
+                <a:effectLst/>
+                <a:latin typeface="Roboto"/>
+              </a:rPr>
+              <a:t>dass</a:t>
+            </a:r>
+            <a:r>
+              <a:rPr lang="en-US" b="0" i="0" dirty="0">
+                <a:solidFill>
+                  <a:srgbClr val="22222A"/>
+                </a:solidFill>
+                <a:effectLst/>
+                <a:latin typeface="Roboto"/>
+              </a:rPr>
+              <a:t> </a:t>
+            </a:r>
+            <a:r>
+              <a:rPr lang="en-US" b="0" i="0" dirty="0" err="1">
+                <a:solidFill>
+                  <a:srgbClr val="22222A"/>
+                </a:solidFill>
+                <a:effectLst/>
+                <a:latin typeface="Roboto"/>
+              </a:rPr>
+              <a:t>Fehler</a:t>
+            </a:r>
+            <a:r>
+              <a:rPr lang="en-US" b="0" i="0" dirty="0">
+                <a:solidFill>
+                  <a:srgbClr val="22222A"/>
+                </a:solidFill>
+                <a:effectLst/>
+                <a:latin typeface="Roboto"/>
+              </a:rPr>
+              <a:t> </a:t>
+            </a:r>
+            <a:r>
+              <a:rPr lang="en-US" b="0" i="0" dirty="0" err="1">
+                <a:solidFill>
+                  <a:srgbClr val="22222A"/>
+                </a:solidFill>
+                <a:effectLst/>
+                <a:latin typeface="Roboto"/>
+              </a:rPr>
+              <a:t>passieren</a:t>
+            </a:r>
+            <a:r>
+              <a:rPr lang="en-US" b="0" i="0" dirty="0">
+                <a:solidFill>
+                  <a:srgbClr val="22222A"/>
+                </a:solidFill>
+                <a:effectLst/>
+                <a:latin typeface="Roboto"/>
+              </a:rPr>
+              <a:t> -&gt; </a:t>
+            </a:r>
+            <a:r>
+              <a:rPr lang="en-US" b="0" i="0" dirty="0" err="1">
+                <a:solidFill>
+                  <a:srgbClr val="22222A"/>
+                </a:solidFill>
+                <a:effectLst/>
+                <a:latin typeface="Roboto"/>
+              </a:rPr>
+              <a:t>trotzdem</a:t>
+            </a:r>
+            <a:r>
+              <a:rPr lang="en-US" b="0" i="0" dirty="0">
+                <a:solidFill>
+                  <a:srgbClr val="22222A"/>
+                </a:solidFill>
+                <a:effectLst/>
+                <a:latin typeface="Roboto"/>
+              </a:rPr>
+              <a:t> </a:t>
+            </a:r>
+            <a:r>
+              <a:rPr lang="en-US" b="0" i="0" dirty="0" err="1">
+                <a:solidFill>
+                  <a:srgbClr val="22222A"/>
+                </a:solidFill>
+                <a:effectLst/>
+                <a:latin typeface="Roboto"/>
+              </a:rPr>
+              <a:t>sicheres</a:t>
+            </a:r>
+            <a:r>
+              <a:rPr lang="en-US" b="0" i="0" dirty="0">
+                <a:solidFill>
+                  <a:srgbClr val="22222A"/>
+                </a:solidFill>
+                <a:effectLst/>
+                <a:latin typeface="Roboto"/>
+              </a:rPr>
+              <a:t> </a:t>
+            </a:r>
+            <a:r>
+              <a:rPr lang="en-US" b="0" i="0" dirty="0" err="1">
+                <a:solidFill>
+                  <a:srgbClr val="22222A"/>
+                </a:solidFill>
+                <a:effectLst/>
+                <a:latin typeface="Roboto"/>
+              </a:rPr>
+              <a:t>Verhalten</a:t>
+            </a:r>
+            <a:r>
+              <a:rPr lang="en-US" b="0" i="0" dirty="0">
+                <a:solidFill>
+                  <a:srgbClr val="22222A"/>
+                </a:solidFill>
+                <a:effectLst/>
+                <a:latin typeface="Roboto"/>
+              </a:rPr>
+              <a:t> -&gt; </a:t>
+            </a:r>
+            <a:r>
+              <a:rPr lang="en-US" b="0" i="0" dirty="0" err="1">
+                <a:solidFill>
+                  <a:srgbClr val="22222A"/>
+                </a:solidFill>
+                <a:effectLst/>
+                <a:latin typeface="Roboto"/>
+              </a:rPr>
+              <a:t>Grundsätzlich</a:t>
+            </a:r>
+            <a:r>
+              <a:rPr lang="en-US" b="0" i="0" dirty="0">
+                <a:solidFill>
+                  <a:srgbClr val="22222A"/>
+                </a:solidFill>
+                <a:effectLst/>
+                <a:latin typeface="Roboto"/>
+              </a:rPr>
+              <a:t> </a:t>
+            </a:r>
+            <a:r>
+              <a:rPr lang="en-US" b="0" i="0" dirty="0" err="1">
+                <a:solidFill>
+                  <a:srgbClr val="22222A"/>
+                </a:solidFill>
+                <a:effectLst/>
+                <a:latin typeface="Roboto"/>
+              </a:rPr>
+              <a:t>verbieten</a:t>
+            </a:r>
+            <a:r>
+              <a:rPr lang="en-US" b="0" i="0" dirty="0">
+                <a:solidFill>
+                  <a:srgbClr val="22222A"/>
+                </a:solidFill>
+                <a:effectLst/>
+                <a:latin typeface="Roboto"/>
+              </a:rPr>
+              <a:t>, </a:t>
+            </a:r>
+            <a:r>
+              <a:rPr lang="en-US" b="0" i="0" dirty="0" err="1">
+                <a:solidFill>
+                  <a:srgbClr val="22222A"/>
+                </a:solidFill>
+                <a:effectLst/>
+                <a:latin typeface="Roboto"/>
+              </a:rPr>
+              <a:t>explizit</a:t>
+            </a:r>
+            <a:r>
+              <a:rPr lang="en-US" b="0" i="0" dirty="0">
+                <a:solidFill>
+                  <a:srgbClr val="22222A"/>
+                </a:solidFill>
+                <a:effectLst/>
+                <a:latin typeface="Roboto"/>
+              </a:rPr>
+              <a:t> </a:t>
+            </a:r>
+            <a:r>
+              <a:rPr lang="en-US" b="0" i="0" dirty="0" err="1">
+                <a:solidFill>
+                  <a:srgbClr val="22222A"/>
+                </a:solidFill>
+                <a:effectLst/>
+                <a:latin typeface="Roboto"/>
+              </a:rPr>
+              <a:t>erlauben</a:t>
+            </a:r>
+            <a:r>
+              <a:rPr lang="en-US" b="0" i="0" dirty="0">
+                <a:solidFill>
+                  <a:srgbClr val="22222A"/>
+                </a:solidFill>
+                <a:effectLst/>
+                <a:latin typeface="Roboto"/>
+              </a:rPr>
+              <a:t>.  -&gt; Security by Default. </a:t>
+            </a:r>
+          </a:p>
+          <a:p>
+            <a:endParaRPr lang="en-US" b="0" i="0" dirty="0">
+              <a:solidFill>
+                <a:srgbClr val="22222A"/>
+              </a:solidFill>
+              <a:effectLst/>
+              <a:latin typeface="Roboto"/>
+            </a:endParaRPr>
+          </a:p>
+          <a:p>
+            <a:r>
+              <a:rPr lang="en-US" b="0" i="0" dirty="0">
+                <a:solidFill>
+                  <a:srgbClr val="22222A"/>
+                </a:solidFill>
+                <a:effectLst/>
+                <a:latin typeface="Roboto"/>
+              </a:rPr>
+              <a:t>CM: strict authorization checks</a:t>
+            </a:r>
+          </a:p>
+          <a:p>
+            <a:endParaRPr lang="en-US" b="0" i="0" dirty="0">
+              <a:solidFill>
+                <a:srgbClr val="22222A"/>
+              </a:solidFill>
+              <a:effectLst/>
+              <a:latin typeface="Roboto"/>
+            </a:endParaRPr>
+          </a:p>
+          <a:p>
+            <a:r>
+              <a:rPr lang="en-US" b="0" i="0" dirty="0">
+                <a:solidFill>
+                  <a:srgbClr val="22222A"/>
+                </a:solidFill>
+                <a:effectLst/>
+                <a:latin typeface="Roboto"/>
+              </a:rPr>
+              <a:t>LP: only the really needed privileges</a:t>
+            </a:r>
+          </a:p>
+          <a:p>
+            <a:endParaRPr lang="en-US" b="0" i="0" dirty="0">
+              <a:solidFill>
+                <a:srgbClr val="22222A"/>
+              </a:solidFill>
+              <a:effectLst/>
+              <a:latin typeface="Roboto"/>
+            </a:endParaRPr>
+          </a:p>
+          <a:p>
+            <a:r>
+              <a:rPr lang="de-AT" b="0" dirty="0" err="1"/>
+              <a:t>LcM</a:t>
+            </a:r>
+            <a:r>
+              <a:rPr lang="de-AT" b="0" dirty="0"/>
+              <a:t>: </a:t>
+            </a:r>
+            <a:r>
+              <a:rPr lang="de-AT" b="0" dirty="0" err="1"/>
+              <a:t>reduce</a:t>
+            </a:r>
+            <a:r>
+              <a:rPr lang="de-AT" b="0" dirty="0"/>
+              <a:t> </a:t>
+            </a:r>
+            <a:r>
+              <a:rPr lang="de-AT" b="0" dirty="0" err="1"/>
+              <a:t>communication</a:t>
+            </a:r>
+            <a:r>
+              <a:rPr lang="de-AT" b="0" dirty="0"/>
+              <a:t> </a:t>
+            </a:r>
+            <a:r>
+              <a:rPr lang="de-AT" b="0" dirty="0" err="1"/>
+              <a:t>path</a:t>
+            </a:r>
+            <a:endParaRPr lang="de-AT" b="0" dirty="0"/>
+          </a:p>
+          <a:p>
+            <a:endParaRPr lang="de-AT" b="0" dirty="0"/>
+          </a:p>
+          <a:p>
+            <a:r>
+              <a:rPr lang="de-AT" b="0" dirty="0" err="1"/>
+              <a:t>SoP</a:t>
+            </a:r>
+            <a:r>
+              <a:rPr lang="de-AT" b="0" dirty="0"/>
+              <a:t>: at least </a:t>
+            </a:r>
+            <a:r>
+              <a:rPr lang="de-AT" b="0" dirty="0" err="1"/>
+              <a:t>two</a:t>
+            </a:r>
+            <a:r>
+              <a:rPr lang="de-AT" b="0" dirty="0"/>
+              <a:t> </a:t>
+            </a:r>
+            <a:r>
+              <a:rPr lang="de-AT" b="0" dirty="0" err="1"/>
+              <a:t>keys</a:t>
+            </a:r>
+            <a:r>
+              <a:rPr lang="de-AT" b="0" dirty="0"/>
+              <a:t> for </a:t>
+            </a:r>
+            <a:r>
+              <a:rPr lang="de-AT" b="0" dirty="0" err="1"/>
+              <a:t>criticals</a:t>
+            </a:r>
+            <a:r>
+              <a:rPr lang="de-AT" b="0" dirty="0"/>
+              <a:t> </a:t>
+            </a:r>
+            <a:r>
+              <a:rPr lang="de-AT" b="0" dirty="0" err="1"/>
+              <a:t>actions</a:t>
+            </a:r>
+            <a:r>
+              <a:rPr lang="de-AT" b="0" dirty="0"/>
+              <a:t> | alternative </a:t>
+            </a:r>
+            <a:r>
+              <a:rPr lang="de-AT" b="0" dirty="0" err="1"/>
+              <a:t>interpretation</a:t>
+            </a:r>
+            <a:r>
+              <a:rPr lang="de-AT" b="0" dirty="0"/>
+              <a:t>: </a:t>
+            </a:r>
+            <a:r>
+              <a:rPr lang="de-AT" b="0" dirty="0" err="1"/>
+              <a:t>dividing</a:t>
+            </a:r>
+            <a:r>
+              <a:rPr lang="de-AT" b="0" dirty="0"/>
+              <a:t> an </a:t>
+            </a:r>
+            <a:r>
+              <a:rPr lang="de-AT" b="0" dirty="0" err="1"/>
+              <a:t>application</a:t>
+            </a:r>
+            <a:endParaRPr lang="de-AT" b="0" dirty="0"/>
+          </a:p>
+          <a:p>
+            <a:endParaRPr lang="de-AT" b="0" dirty="0"/>
+          </a:p>
+          <a:p>
+            <a:r>
+              <a:rPr lang="de-AT" b="0" dirty="0"/>
+              <a:t>OD: Security </a:t>
+            </a:r>
+            <a:r>
+              <a:rPr lang="de-AT" b="0" dirty="0" err="1"/>
+              <a:t>may</a:t>
+            </a:r>
+            <a:r>
+              <a:rPr lang="de-AT" b="0" dirty="0"/>
+              <a:t> not </a:t>
+            </a:r>
+            <a:r>
+              <a:rPr lang="de-AT" b="0" dirty="0" err="1"/>
+              <a:t>depend</a:t>
+            </a:r>
+            <a:r>
+              <a:rPr lang="de-AT" b="0" dirty="0"/>
+              <a:t> on </a:t>
+            </a:r>
+            <a:r>
+              <a:rPr lang="de-AT" b="0" dirty="0" err="1"/>
+              <a:t>the</a:t>
+            </a:r>
+            <a:r>
+              <a:rPr lang="de-AT" b="0" dirty="0"/>
+              <a:t> </a:t>
+            </a:r>
+            <a:r>
+              <a:rPr lang="de-AT" b="0" dirty="0" err="1"/>
+              <a:t>fact</a:t>
+            </a:r>
+            <a:r>
+              <a:rPr lang="de-AT" b="0" dirty="0"/>
+              <a:t> </a:t>
+            </a:r>
+            <a:r>
+              <a:rPr lang="de-AT" b="0" dirty="0" err="1"/>
+              <a:t>that</a:t>
+            </a:r>
+            <a:r>
+              <a:rPr lang="de-AT" b="0" dirty="0"/>
+              <a:t> </a:t>
+            </a:r>
+            <a:r>
+              <a:rPr lang="de-AT" b="0" dirty="0" err="1"/>
+              <a:t>nobody</a:t>
+            </a:r>
+            <a:r>
+              <a:rPr lang="de-AT" b="0" dirty="0"/>
+              <a:t> </a:t>
+            </a:r>
+            <a:r>
+              <a:rPr lang="de-AT" b="0" dirty="0" err="1"/>
+              <a:t>knows</a:t>
+            </a:r>
+            <a:r>
+              <a:rPr lang="de-AT" b="0" dirty="0"/>
+              <a:t> </a:t>
+            </a:r>
+            <a:r>
+              <a:rPr lang="de-AT" b="0" dirty="0" err="1"/>
+              <a:t>how</a:t>
+            </a:r>
+            <a:r>
+              <a:rPr lang="de-AT" b="0" dirty="0"/>
+              <a:t> </a:t>
+            </a:r>
+            <a:r>
+              <a:rPr lang="de-AT" b="0" dirty="0" err="1"/>
+              <a:t>it</a:t>
+            </a:r>
+            <a:r>
+              <a:rPr lang="de-AT" b="0" dirty="0"/>
+              <a:t> </a:t>
+            </a:r>
+            <a:r>
+              <a:rPr lang="de-AT" b="0" dirty="0" err="1"/>
+              <a:t>works</a:t>
+            </a:r>
+            <a:endParaRPr lang="de-AT" b="0" dirty="0"/>
+          </a:p>
+          <a:p>
+            <a:endParaRPr lang="de-AT" b="0" dirty="0"/>
+          </a:p>
+          <a:p>
+            <a:r>
+              <a:rPr lang="de-AT" b="0" dirty="0"/>
+              <a:t>PA: </a:t>
+            </a:r>
+            <a:r>
+              <a:rPr lang="de-AT" b="0" dirty="0" err="1"/>
+              <a:t>must</a:t>
+            </a:r>
+            <a:r>
+              <a:rPr lang="de-AT" b="0" dirty="0"/>
+              <a:t> </a:t>
+            </a:r>
+            <a:r>
+              <a:rPr lang="de-AT" b="0" dirty="0" err="1"/>
+              <a:t>be</a:t>
+            </a:r>
+            <a:r>
+              <a:rPr lang="de-AT" b="0" dirty="0"/>
+              <a:t> </a:t>
+            </a:r>
+            <a:r>
+              <a:rPr lang="de-AT" b="0" dirty="0" err="1"/>
+              <a:t>useable</a:t>
+            </a:r>
+            <a:r>
+              <a:rPr lang="de-AT" b="0" dirty="0"/>
+              <a:t> for </a:t>
+            </a:r>
+            <a:r>
+              <a:rPr lang="de-AT" b="0" dirty="0" err="1"/>
+              <a:t>humans</a:t>
+            </a:r>
+            <a:endParaRPr lang="de-AT" b="0" dirty="0"/>
+          </a:p>
+          <a:p>
+            <a:endParaRPr lang="de-AT" dirty="0"/>
+          </a:p>
         </p:txBody>
       </p:sp>
       <p:sp>
@@ -11995,7 +12559,7 @@
           <a:p>
             <a:fld id="{00701009-9ECF-4181-90A1-5A0A499163F4}" type="datetimeFigureOut">
               <a:rPr lang="de-AT" smtClean="0"/>
-              <a:t>18.11.2020</a:t>
+              <a:t>18.02.2021</a:t>
             </a:fld>
             <a:endParaRPr lang="de-AT"/>
           </a:p>
@@ -12284,7 +12848,7 @@
           <a:p>
             <a:fld id="{00701009-9ECF-4181-90A1-5A0A499163F4}" type="datetimeFigureOut">
               <a:rPr lang="de-AT" smtClean="0"/>
-              <a:t>18.11.2020</a:t>
+              <a:t>18.02.2021</a:t>
             </a:fld>
             <a:endParaRPr lang="de-AT"/>
           </a:p>
@@ -12484,7 +13048,7 @@
           <a:p>
             <a:fld id="{00701009-9ECF-4181-90A1-5A0A499163F4}" type="datetimeFigureOut">
               <a:rPr lang="de-AT" smtClean="0"/>
-              <a:t>18.11.2020</a:t>
+              <a:t>18.02.2021</a:t>
             </a:fld>
             <a:endParaRPr lang="de-AT"/>
           </a:p>
@@ -12694,7 +13258,7 @@
           <a:p>
             <a:fld id="{00701009-9ECF-4181-90A1-5A0A499163F4}" type="datetimeFigureOut">
               <a:rPr lang="de-AT" smtClean="0"/>
-              <a:t>18.11.2020</a:t>
+              <a:t>18.02.2021</a:t>
             </a:fld>
             <a:endParaRPr lang="de-AT"/>
           </a:p>
@@ -12894,7 +13458,7 @@
           <a:p>
             <a:fld id="{00701009-9ECF-4181-90A1-5A0A499163F4}" type="datetimeFigureOut">
               <a:rPr lang="de-AT" smtClean="0"/>
-              <a:t>18.11.2020</a:t>
+              <a:t>18.02.2021</a:t>
             </a:fld>
             <a:endParaRPr lang="de-AT"/>
           </a:p>
@@ -13170,7 +13734,7 @@
           <a:p>
             <a:fld id="{00701009-9ECF-4181-90A1-5A0A499163F4}" type="datetimeFigureOut">
               <a:rPr lang="de-AT" smtClean="0"/>
-              <a:t>18.11.2020</a:t>
+              <a:t>18.02.2021</a:t>
             </a:fld>
             <a:endParaRPr lang="de-AT"/>
           </a:p>
@@ -13438,7 +14002,7 @@
           <a:p>
             <a:fld id="{00701009-9ECF-4181-90A1-5A0A499163F4}" type="datetimeFigureOut">
               <a:rPr lang="de-AT" smtClean="0"/>
-              <a:t>18.11.2020</a:t>
+              <a:t>18.02.2021</a:t>
             </a:fld>
             <a:endParaRPr lang="de-AT"/>
           </a:p>
@@ -13853,7 +14417,7 @@
           <a:p>
             <a:fld id="{00701009-9ECF-4181-90A1-5A0A499163F4}" type="datetimeFigureOut">
               <a:rPr lang="de-AT" smtClean="0"/>
-              <a:t>18.11.2020</a:t>
+              <a:t>18.02.2021</a:t>
             </a:fld>
             <a:endParaRPr lang="de-AT"/>
           </a:p>
@@ -13995,7 +14559,7 @@
           <a:p>
             <a:fld id="{00701009-9ECF-4181-90A1-5A0A499163F4}" type="datetimeFigureOut">
               <a:rPr lang="de-AT" smtClean="0"/>
-              <a:t>18.11.2020</a:t>
+              <a:t>18.02.2021</a:t>
             </a:fld>
             <a:endParaRPr lang="de-AT"/>
           </a:p>
@@ -14201,7 +14765,7 @@
           <a:p>
             <a:fld id="{00701009-9ECF-4181-90A1-5A0A499163F4}" type="datetimeFigureOut">
               <a:rPr lang="de-AT" smtClean="0"/>
-              <a:t>18.11.2020</a:t>
+              <a:t>18.02.2021</a:t>
             </a:fld>
             <a:endParaRPr lang="de-AT"/>
           </a:p>
@@ -14514,7 +15078,7 @@
           <a:p>
             <a:fld id="{00701009-9ECF-4181-90A1-5A0A499163F4}" type="datetimeFigureOut">
               <a:rPr lang="de-AT" smtClean="0"/>
-              <a:t>18.11.2020</a:t>
+              <a:t>18.02.2021</a:t>
             </a:fld>
             <a:endParaRPr lang="de-AT"/>
           </a:p>
@@ -14757,7 +15321,7 @@
           <a:p>
             <a:fld id="{00701009-9ECF-4181-90A1-5A0A499163F4}" type="datetimeFigureOut">
               <a:rPr lang="de-AT" smtClean="0"/>
-              <a:t>18.11.2020</a:t>
+              <a:t>18.02.2021</a:t>
             </a:fld>
             <a:endParaRPr lang="de-AT"/>
           </a:p>

</xml_diff>

<commit_message>
Updated OWASP Top 10 and OWASP Testing Guide versions.
</commit_message>
<xml_diff>
--- a/slides/2_Basic_Principles_and_Resources.pptx
+++ b/slides/2_Basic_Principles_and_Resources.pptx
@@ -129,13 +129,76 @@
 <file path=ppt/revisionInfo.xml><?xml version="1.0" encoding="utf-8"?>
 <p1510:revInfo xmlns:a="http://schemas.openxmlformats.org/drawingml/2006/main" xmlns:r="http://schemas.openxmlformats.org/officeDocument/2006/relationships" xmlns:p1510="http://schemas.microsoft.com/office/powerpoint/2015/10/main">
   <p1510:revLst>
-    <p1510:client id="{2D404540-AFFE-4CC5-BC81-AA7E0252D251}" v="1" dt="2021-02-18T19:43:32.212"/>
+    <p1510:client id="{DF3647DF-3393-4D5E-8CD0-3A04015B3B9D}" v="2" dt="2022-03-18T20:56:30.884"/>
   </p1510:revLst>
 </p1510:revInfo>
 </file>
 
 <file path=ppt/changesInfos/changesInfo1.xml><?xml version="1.0" encoding="utf-8"?>
 <pc:chgInfo xmlns:a="http://schemas.openxmlformats.org/drawingml/2006/main" xmlns:r="http://schemas.openxmlformats.org/officeDocument/2006/relationships" xmlns:ac="http://schemas.microsoft.com/office/drawing/2013/main/command" xmlns:pc="http://schemas.microsoft.com/office/powerpoint/2013/main/command">
+  <pc:docChgLst>
+    <pc:chgData name="Daniel Schwarz" userId="5bb35bb8-905a-4742-88d9-33d9089732e7" providerId="ADAL" clId="{DF3647DF-3393-4D5E-8CD0-3A04015B3B9D}"/>
+    <pc:docChg chg="custSel modSld">
+      <pc:chgData name="Daniel Schwarz" userId="5bb35bb8-905a-4742-88d9-33d9089732e7" providerId="ADAL" clId="{DF3647DF-3393-4D5E-8CD0-3A04015B3B9D}" dt="2022-03-18T20:59:16.659" v="36" actId="1076"/>
+      <pc:docMkLst>
+        <pc:docMk/>
+      </pc:docMkLst>
+      <pc:sldChg chg="addSp delSp modSp mod">
+        <pc:chgData name="Daniel Schwarz" userId="5bb35bb8-905a-4742-88d9-33d9089732e7" providerId="ADAL" clId="{DF3647DF-3393-4D5E-8CD0-3A04015B3B9D}" dt="2022-03-18T20:56:46.815" v="25" actId="1035"/>
+        <pc:sldMkLst>
+          <pc:docMk/>
+          <pc:sldMk cId="47617300" sldId="297"/>
+        </pc:sldMkLst>
+        <pc:spChg chg="mod">
+          <ac:chgData name="Daniel Schwarz" userId="5bb35bb8-905a-4742-88d9-33d9089732e7" providerId="ADAL" clId="{DF3647DF-3393-4D5E-8CD0-3A04015B3B9D}" dt="2022-03-18T20:56:39.252" v="16"/>
+          <ac:spMkLst>
+            <pc:docMk/>
+            <pc:sldMk cId="47617300" sldId="297"/>
+            <ac:spMk id="6" creationId="{8EC801B8-AC5D-4DCF-8AA0-7FD9A37610EE}"/>
+          </ac:spMkLst>
+        </pc:spChg>
+        <pc:picChg chg="add mod">
+          <ac:chgData name="Daniel Schwarz" userId="5bb35bb8-905a-4742-88d9-33d9089732e7" providerId="ADAL" clId="{DF3647DF-3393-4D5E-8CD0-3A04015B3B9D}" dt="2022-03-18T20:56:46.815" v="25" actId="1035"/>
+          <ac:picMkLst>
+            <pc:docMk/>
+            <pc:sldMk cId="47617300" sldId="297"/>
+            <ac:picMk id="3" creationId="{B56161FE-822C-4DC1-B6CB-06EB68A77C96}"/>
+          </ac:picMkLst>
+        </pc:picChg>
+        <pc:picChg chg="del">
+          <ac:chgData name="Daniel Schwarz" userId="5bb35bb8-905a-4742-88d9-33d9089732e7" providerId="ADAL" clId="{DF3647DF-3393-4D5E-8CD0-3A04015B3B9D}" dt="2022-03-18T20:52:57.981" v="0" actId="478"/>
+          <ac:picMkLst>
+            <pc:docMk/>
+            <pc:sldMk cId="47617300" sldId="297"/>
+            <ac:picMk id="7" creationId="{6B9567A5-D9EE-44DD-B0B8-393384111180}"/>
+          </ac:picMkLst>
+        </pc:picChg>
+      </pc:sldChg>
+      <pc:sldChg chg="addSp delSp modSp mod">
+        <pc:chgData name="Daniel Schwarz" userId="5bb35bb8-905a-4742-88d9-33d9089732e7" providerId="ADAL" clId="{DF3647DF-3393-4D5E-8CD0-3A04015B3B9D}" dt="2022-03-18T20:59:16.659" v="36" actId="1076"/>
+        <pc:sldMkLst>
+          <pc:docMk/>
+          <pc:sldMk cId="3792953039" sldId="298"/>
+        </pc:sldMkLst>
+        <pc:picChg chg="del">
+          <ac:chgData name="Daniel Schwarz" userId="5bb35bb8-905a-4742-88d9-33d9089732e7" providerId="ADAL" clId="{DF3647DF-3393-4D5E-8CD0-3A04015B3B9D}" dt="2022-03-18T20:58:16.169" v="26" actId="478"/>
+          <ac:picMkLst>
+            <pc:docMk/>
+            <pc:sldMk cId="3792953039" sldId="298"/>
+            <ac:picMk id="5" creationId="{2DDC59B1-A654-47A8-9957-A4A33102AB2F}"/>
+          </ac:picMkLst>
+        </pc:picChg>
+        <pc:picChg chg="add mod modCrop">
+          <ac:chgData name="Daniel Schwarz" userId="5bb35bb8-905a-4742-88d9-33d9089732e7" providerId="ADAL" clId="{DF3647DF-3393-4D5E-8CD0-3A04015B3B9D}" dt="2022-03-18T20:59:16.659" v="36" actId="1076"/>
+          <ac:picMkLst>
+            <pc:docMk/>
+            <pc:sldMk cId="3792953039" sldId="298"/>
+            <ac:picMk id="6" creationId="{19AC13EC-836E-4CB3-8939-FBA32FEE95AA}"/>
+          </ac:picMkLst>
+        </pc:picChg>
+      </pc:sldChg>
+    </pc:docChg>
+  </pc:docChgLst>
   <pc:docChgLst>
     <pc:chgData name="Daniel Schwarz" userId="5bb35bb8-905a-4742-88d9-33d9089732e7" providerId="ADAL" clId="{2D404540-AFFE-4CC5-BC81-AA7E0252D251}"/>
     <pc:docChg chg="modSld">
@@ -11377,7 +11440,7 @@
           <a:p>
             <a:fld id="{E9A67217-929B-4143-94A9-94A0B9892952}" type="datetimeFigureOut">
               <a:rPr lang="de-AT" smtClean="0"/>
-              <a:t>18.02.2021</a:t>
+              <a:t>18.03.2022</a:t>
             </a:fld>
             <a:endParaRPr lang="de-AT"/>
           </a:p>
@@ -12410,6 +12473,90 @@
 </p:notes>
 </file>
 
+<file path=ppt/notesSlides/notesSlide3.xml><?xml version="1.0" encoding="utf-8"?>
+<p:notes xmlns:a="http://schemas.openxmlformats.org/drawingml/2006/main" xmlns:r="http://schemas.openxmlformats.org/officeDocument/2006/relationships" xmlns:p="http://schemas.openxmlformats.org/presentationml/2006/main">
+  <p:cSld>
+    <p:spTree>
+      <p:nvGrpSpPr>
+        <p:cNvPr id="1" name=""/>
+        <p:cNvGrpSpPr/>
+        <p:nvPr/>
+      </p:nvGrpSpPr>
+      <p:grpSpPr>
+        <a:xfrm>
+          <a:off x="0" y="0"/>
+          <a:ext cx="0" cy="0"/>
+          <a:chOff x="0" y="0"/>
+          <a:chExt cx="0" cy="0"/>
+        </a:xfrm>
+      </p:grpSpPr>
+      <p:sp>
+        <p:nvSpPr>
+          <p:cNvPr id="2" name="Folienbildplatzhalter 1"/>
+          <p:cNvSpPr>
+            <a:spLocks noGrp="1" noRot="1" noChangeAspect="1"/>
+          </p:cNvSpPr>
+          <p:nvPr>
+            <p:ph type="sldImg"/>
+          </p:nvPr>
+        </p:nvSpPr>
+        <p:spPr/>
+      </p:sp>
+      <p:sp>
+        <p:nvSpPr>
+          <p:cNvPr id="3" name="Notizenplatzhalter 2"/>
+          <p:cNvSpPr>
+            <a:spLocks noGrp="1"/>
+          </p:cNvSpPr>
+          <p:nvPr>
+            <p:ph type="body" idx="1"/>
+          </p:nvPr>
+        </p:nvSpPr>
+        <p:spPr/>
+        <p:txBody>
+          <a:bodyPr/>
+          <a:lstStyle/>
+          <a:p>
+            <a:endParaRPr lang="en-US" dirty="0"/>
+          </a:p>
+        </p:txBody>
+      </p:sp>
+      <p:sp>
+        <p:nvSpPr>
+          <p:cNvPr id="4" name="Foliennummernplatzhalter 3"/>
+          <p:cNvSpPr>
+            <a:spLocks noGrp="1"/>
+          </p:cNvSpPr>
+          <p:nvPr>
+            <p:ph type="sldNum" sz="quarter" idx="5"/>
+          </p:nvPr>
+        </p:nvSpPr>
+        <p:spPr/>
+        <p:txBody>
+          <a:bodyPr/>
+          <a:lstStyle/>
+          <a:p>
+            <a:fld id="{CE96FE10-F234-4139-B996-7DAF09A6C84B}" type="slidenum">
+              <a:rPr lang="de-AT" smtClean="0"/>
+              <a:t>8</a:t>
+            </a:fld>
+            <a:endParaRPr lang="de-AT"/>
+          </a:p>
+        </p:txBody>
+      </p:sp>
+    </p:spTree>
+    <p:extLst>
+      <p:ext uri="{BB962C8B-B14F-4D97-AF65-F5344CB8AC3E}">
+        <p14:creationId xmlns:p14="http://schemas.microsoft.com/office/powerpoint/2010/main" val="3948697996"/>
+      </p:ext>
+    </p:extLst>
+  </p:cSld>
+  <p:clrMapOvr>
+    <a:masterClrMapping/>
+  </p:clrMapOvr>
+</p:notes>
+</file>
+
 <file path=ppt/slideLayouts/slideLayout1.xml><?xml version="1.0" encoding="utf-8"?>
 <p:sldLayout xmlns:a="http://schemas.openxmlformats.org/drawingml/2006/main" xmlns:r="http://schemas.openxmlformats.org/officeDocument/2006/relationships" xmlns:p="http://schemas.openxmlformats.org/presentationml/2006/main" type="title" preserve="1">
   <p:cSld name="Titelfolie">
@@ -12559,7 +12706,7 @@
           <a:p>
             <a:fld id="{00701009-9ECF-4181-90A1-5A0A499163F4}" type="datetimeFigureOut">
               <a:rPr lang="de-AT" smtClean="0"/>
-              <a:t>18.02.2021</a:t>
+              <a:t>18.03.2022</a:t>
             </a:fld>
             <a:endParaRPr lang="de-AT"/>
           </a:p>
@@ -12848,7 +12995,7 @@
           <a:p>
             <a:fld id="{00701009-9ECF-4181-90A1-5A0A499163F4}" type="datetimeFigureOut">
               <a:rPr lang="de-AT" smtClean="0"/>
-              <a:t>18.02.2021</a:t>
+              <a:t>18.03.2022</a:t>
             </a:fld>
             <a:endParaRPr lang="de-AT"/>
           </a:p>
@@ -13048,7 +13195,7 @@
           <a:p>
             <a:fld id="{00701009-9ECF-4181-90A1-5A0A499163F4}" type="datetimeFigureOut">
               <a:rPr lang="de-AT" smtClean="0"/>
-              <a:t>18.02.2021</a:t>
+              <a:t>18.03.2022</a:t>
             </a:fld>
             <a:endParaRPr lang="de-AT"/>
           </a:p>
@@ -13258,7 +13405,7 @@
           <a:p>
             <a:fld id="{00701009-9ECF-4181-90A1-5A0A499163F4}" type="datetimeFigureOut">
               <a:rPr lang="de-AT" smtClean="0"/>
-              <a:t>18.02.2021</a:t>
+              <a:t>18.03.2022</a:t>
             </a:fld>
             <a:endParaRPr lang="de-AT"/>
           </a:p>
@@ -13458,7 +13605,7 @@
           <a:p>
             <a:fld id="{00701009-9ECF-4181-90A1-5A0A499163F4}" type="datetimeFigureOut">
               <a:rPr lang="de-AT" smtClean="0"/>
-              <a:t>18.02.2021</a:t>
+              <a:t>18.03.2022</a:t>
             </a:fld>
             <a:endParaRPr lang="de-AT"/>
           </a:p>
@@ -13734,7 +13881,7 @@
           <a:p>
             <a:fld id="{00701009-9ECF-4181-90A1-5A0A499163F4}" type="datetimeFigureOut">
               <a:rPr lang="de-AT" smtClean="0"/>
-              <a:t>18.02.2021</a:t>
+              <a:t>18.03.2022</a:t>
             </a:fld>
             <a:endParaRPr lang="de-AT"/>
           </a:p>
@@ -14002,7 +14149,7 @@
           <a:p>
             <a:fld id="{00701009-9ECF-4181-90A1-5A0A499163F4}" type="datetimeFigureOut">
               <a:rPr lang="de-AT" smtClean="0"/>
-              <a:t>18.02.2021</a:t>
+              <a:t>18.03.2022</a:t>
             </a:fld>
             <a:endParaRPr lang="de-AT"/>
           </a:p>
@@ -14417,7 +14564,7 @@
           <a:p>
             <a:fld id="{00701009-9ECF-4181-90A1-5A0A499163F4}" type="datetimeFigureOut">
               <a:rPr lang="de-AT" smtClean="0"/>
-              <a:t>18.02.2021</a:t>
+              <a:t>18.03.2022</a:t>
             </a:fld>
             <a:endParaRPr lang="de-AT"/>
           </a:p>
@@ -14559,7 +14706,7 @@
           <a:p>
             <a:fld id="{00701009-9ECF-4181-90A1-5A0A499163F4}" type="datetimeFigureOut">
               <a:rPr lang="de-AT" smtClean="0"/>
-              <a:t>18.02.2021</a:t>
+              <a:t>18.03.2022</a:t>
             </a:fld>
             <a:endParaRPr lang="de-AT"/>
           </a:p>
@@ -14765,7 +14912,7 @@
           <a:p>
             <a:fld id="{00701009-9ECF-4181-90A1-5A0A499163F4}" type="datetimeFigureOut">
               <a:rPr lang="de-AT" smtClean="0"/>
-              <a:t>18.02.2021</a:t>
+              <a:t>18.03.2022</a:t>
             </a:fld>
             <a:endParaRPr lang="de-AT"/>
           </a:p>
@@ -15078,7 +15225,7 @@
           <a:p>
             <a:fld id="{00701009-9ECF-4181-90A1-5A0A499163F4}" type="datetimeFigureOut">
               <a:rPr lang="de-AT" smtClean="0"/>
-              <a:t>18.02.2021</a:t>
+              <a:t>18.03.2022</a:t>
             </a:fld>
             <a:endParaRPr lang="de-AT"/>
           </a:p>
@@ -15321,7 +15468,7 @@
           <a:p>
             <a:fld id="{00701009-9ECF-4181-90A1-5A0A499163F4}" type="datetimeFigureOut">
               <a:rPr lang="de-AT" smtClean="0"/>
-              <a:t>18.02.2021</a:t>
+              <a:t>18.03.2022</a:t>
             </a:fld>
             <a:endParaRPr lang="de-AT"/>
           </a:p>
@@ -15931,10 +16078,10 @@
       </p:sp>
       <p:pic>
         <p:nvPicPr>
-          <p:cNvPr id="5" name="Grafik 4">
+          <p:cNvPr id="6" name="Grafik 5">
             <a:extLst>
               <a:ext uri="{FF2B5EF4-FFF2-40B4-BE49-F238E27FC236}">
-                <a16:creationId xmlns:a16="http://schemas.microsoft.com/office/drawing/2014/main" id="{2DDC59B1-A654-47A8-9957-A4A33102AB2F}"/>
+                <a16:creationId xmlns:a16="http://schemas.microsoft.com/office/drawing/2014/main" id="{19AC13EC-836E-4CB3-8939-FBA32FEE95AA}"/>
               </a:ext>
             </a:extLst>
           </p:cNvPr>
@@ -15943,16 +16090,15 @@
           </p:cNvPicPr>
           <p:nvPr/>
         </p:nvPicPr>
-        <p:blipFill>
+        <p:blipFill rotWithShape="1">
           <a:blip r:embed="rId2"/>
-          <a:stretch>
-            <a:fillRect/>
-          </a:stretch>
+          <a:srcRect l="758" t="1577" r="2005"/>
+          <a:stretch/>
         </p:blipFill>
         <p:spPr>
           <a:xfrm>
-            <a:off x="4474206" y="1450428"/>
-            <a:ext cx="3243587" cy="4582510"/>
+            <a:off x="4456384" y="1509815"/>
+            <a:ext cx="3279228" cy="4656082"/>
           </a:xfrm>
           <a:prstGeom prst="rect">
             <a:avLst/>
@@ -20890,8 +21036,8 @@
         </p:nvSpPr>
         <p:spPr>
           <a:xfrm>
-            <a:off x="173118" y="6165897"/>
-            <a:ext cx="11845761" cy="369332"/>
+            <a:off x="173118" y="5924160"/>
+            <a:ext cx="11845761" cy="646331"/>
           </a:xfrm>
           <a:prstGeom prst="rect">
             <a:avLst/>
@@ -20909,16 +21055,22 @@
               <a:rPr lang="de-DE" dirty="0"/>
               <a:t>https://owasp.org/www-project-top-ten/</a:t>
             </a:r>
-            <a:endParaRPr lang="de-AT" dirty="0"/>
+          </a:p>
+          <a:p>
+            <a:pPr algn="ctr"/>
+            <a:r>
+              <a:rPr lang="de-AT" dirty="0"/>
+              <a:t>https://owasp.org/Top10</a:t>
+            </a:r>
           </a:p>
         </p:txBody>
       </p:sp>
       <p:pic>
         <p:nvPicPr>
-          <p:cNvPr id="7" name="Grafik 6">
+          <p:cNvPr id="3" name="Grafik 2">
             <a:extLst>
               <a:ext uri="{FF2B5EF4-FFF2-40B4-BE49-F238E27FC236}">
-                <a16:creationId xmlns:a16="http://schemas.microsoft.com/office/drawing/2014/main" id="{6B9567A5-D9EE-44DD-B0B8-393384111180}"/>
+                <a16:creationId xmlns:a16="http://schemas.microsoft.com/office/drawing/2014/main" id="{B56161FE-822C-4DC1-B6CB-06EB68A77C96}"/>
               </a:ext>
             </a:extLst>
           </p:cNvPr>
@@ -20928,15 +21080,15 @@
           <p:nvPr/>
         </p:nvPicPr>
         <p:blipFill>
-          <a:blip r:embed="rId2"/>
+          <a:blip r:embed="rId3"/>
           <a:stretch>
             <a:fillRect/>
           </a:stretch>
         </p:blipFill>
         <p:spPr>
           <a:xfrm>
-            <a:off x="1852531" y="1468644"/>
-            <a:ext cx="8486934" cy="4616848"/>
+            <a:off x="530770" y="1969716"/>
+            <a:ext cx="11130455" cy="3107752"/>
           </a:xfrm>
           <a:prstGeom prst="rect">
             <a:avLst/>

</xml_diff>

<commit_message>
added owasp cheat sheet series to recommended resources.
</commit_message>
<xml_diff>
--- a/slides/2_Basic_Principles_and_Resources.pptx
+++ b/slides/2_Basic_Principles_and_Resources.pptx
@@ -5,7 +5,7 @@
     <p:sldMasterId id="2147483648" r:id="rId1"/>
   </p:sldMasterIdLst>
   <p:notesMasterIdLst>
-    <p:notesMasterId r:id="rId14"/>
+    <p:notesMasterId r:id="rId15"/>
   </p:notesMasterIdLst>
   <p:sldIdLst>
     <p:sldId id="256" r:id="rId2"/>
@@ -18,8 +18,9 @@
     <p:sldId id="297" r:id="rId9"/>
     <p:sldId id="299" r:id="rId10"/>
     <p:sldId id="298" r:id="rId11"/>
-    <p:sldId id="301" r:id="rId12"/>
-    <p:sldId id="306" r:id="rId13"/>
+    <p:sldId id="307" r:id="rId12"/>
+    <p:sldId id="301" r:id="rId13"/>
+    <p:sldId id="306" r:id="rId14"/>
   </p:sldIdLst>
   <p:sldSz cx="12192000" cy="6858000"/>
   <p:notesSz cx="6858000" cy="9144000"/>
@@ -129,7 +130,7 @@
 <file path=ppt/revisionInfo.xml><?xml version="1.0" encoding="utf-8"?>
 <p1510:revInfo xmlns:a="http://schemas.openxmlformats.org/drawingml/2006/main" xmlns:r="http://schemas.openxmlformats.org/officeDocument/2006/relationships" xmlns:p1510="http://schemas.microsoft.com/office/powerpoint/2015/10/main">
   <p1510:revLst>
-    <p1510:client id="{DF3647DF-3393-4D5E-8CD0-3A04015B3B9D}" v="2" dt="2022-03-18T20:56:30.884"/>
+    <p1510:client id="{DF3647DF-3393-4D5E-8CD0-3A04015B3B9D}" v="11" dt="2023-04-10T14:19:50.303"/>
   </p1510:revLst>
 </p1510:revInfo>
 </file>
@@ -138,8 +139,8 @@
 <pc:chgInfo xmlns:a="http://schemas.openxmlformats.org/drawingml/2006/main" xmlns:r="http://schemas.openxmlformats.org/officeDocument/2006/relationships" xmlns:ac="http://schemas.microsoft.com/office/drawing/2013/main/command" xmlns:pc="http://schemas.microsoft.com/office/powerpoint/2013/main/command">
   <pc:docChgLst>
     <pc:chgData name="Daniel Schwarz" userId="5bb35bb8-905a-4742-88d9-33d9089732e7" providerId="ADAL" clId="{DF3647DF-3393-4D5E-8CD0-3A04015B3B9D}"/>
-    <pc:docChg chg="custSel modSld">
-      <pc:chgData name="Daniel Schwarz" userId="5bb35bb8-905a-4742-88d9-33d9089732e7" providerId="ADAL" clId="{DF3647DF-3393-4D5E-8CD0-3A04015B3B9D}" dt="2022-03-18T20:59:16.659" v="36" actId="1076"/>
+    <pc:docChg chg="undo custSel addSld modSld">
+      <pc:chgData name="Daniel Schwarz" userId="5bb35bb8-905a-4742-88d9-33d9089732e7" providerId="ADAL" clId="{DF3647DF-3393-4D5E-8CD0-3A04015B3B9D}" dt="2023-04-10T14:19:50.303" v="82" actId="1076"/>
       <pc:docMkLst>
         <pc:docMk/>
       </pc:docMkLst>
@@ -194,6 +195,45 @@
             <pc:docMk/>
             <pc:sldMk cId="3792953039" sldId="298"/>
             <ac:picMk id="6" creationId="{19AC13EC-836E-4CB3-8939-FBA32FEE95AA}"/>
+          </ac:picMkLst>
+        </pc:picChg>
+      </pc:sldChg>
+      <pc:sldChg chg="addSp delSp modSp new mod">
+        <pc:chgData name="Daniel Schwarz" userId="5bb35bb8-905a-4742-88d9-33d9089732e7" providerId="ADAL" clId="{DF3647DF-3393-4D5E-8CD0-3A04015B3B9D}" dt="2023-04-10T14:19:50.303" v="82" actId="1076"/>
+        <pc:sldMkLst>
+          <pc:docMk/>
+          <pc:sldMk cId="4186641867" sldId="307"/>
+        </pc:sldMkLst>
+        <pc:spChg chg="mod">
+          <ac:chgData name="Daniel Schwarz" userId="5bb35bb8-905a-4742-88d9-33d9089732e7" providerId="ADAL" clId="{DF3647DF-3393-4D5E-8CD0-3A04015B3B9D}" dt="2023-04-10T14:18:25.282" v="61" actId="20577"/>
+          <ac:spMkLst>
+            <pc:docMk/>
+            <pc:sldMk cId="4186641867" sldId="307"/>
+            <ac:spMk id="2" creationId="{568DEAF1-7336-79AF-9058-50A7E8A6D001}"/>
+          </ac:spMkLst>
+        </pc:spChg>
+        <pc:spChg chg="add del mod">
+          <ac:chgData name="Daniel Schwarz" userId="5bb35bb8-905a-4742-88d9-33d9089732e7" providerId="ADAL" clId="{DF3647DF-3393-4D5E-8CD0-3A04015B3B9D}" dt="2023-04-10T14:19:35.095" v="77" actId="478"/>
+          <ac:spMkLst>
+            <pc:docMk/>
+            <pc:sldMk cId="4186641867" sldId="307"/>
+            <ac:spMk id="4" creationId="{7861C420-B920-FD14-9CA6-6C41580F8F05}"/>
+          </ac:spMkLst>
+        </pc:spChg>
+        <pc:spChg chg="add mod">
+          <ac:chgData name="Daniel Schwarz" userId="5bb35bb8-905a-4742-88d9-33d9089732e7" providerId="ADAL" clId="{DF3647DF-3393-4D5E-8CD0-3A04015B3B9D}" dt="2023-04-10T14:19:40.173" v="80"/>
+          <ac:spMkLst>
+            <pc:docMk/>
+            <pc:sldMk cId="4186641867" sldId="307"/>
+            <ac:spMk id="5" creationId="{D24E9FFC-ADC4-5E26-E756-71EA01C541C6}"/>
+          </ac:spMkLst>
+        </pc:spChg>
+        <pc:picChg chg="add mod">
+          <ac:chgData name="Daniel Schwarz" userId="5bb35bb8-905a-4742-88d9-33d9089732e7" providerId="ADAL" clId="{DF3647DF-3393-4D5E-8CD0-3A04015B3B9D}" dt="2023-04-10T14:19:50.303" v="82" actId="1076"/>
+          <ac:picMkLst>
+            <pc:docMk/>
+            <pc:sldMk cId="4186641867" sldId="307"/>
+            <ac:picMk id="1026" creationId="{02E02A53-2A47-0385-B9EB-2F877DF723FF}"/>
           </ac:picMkLst>
         </pc:picChg>
       </pc:sldChg>
@@ -11440,7 +11480,7 @@
           <a:p>
             <a:fld id="{E9A67217-929B-4143-94A9-94A0B9892952}" type="datetimeFigureOut">
               <a:rPr lang="de-AT" smtClean="0"/>
-              <a:t>18.03.2022</a:t>
+              <a:t>10.04.2023</a:t>
             </a:fld>
             <a:endParaRPr lang="de-AT"/>
           </a:p>
@@ -12706,7 +12746,7 @@
           <a:p>
             <a:fld id="{00701009-9ECF-4181-90A1-5A0A499163F4}" type="datetimeFigureOut">
               <a:rPr lang="de-AT" smtClean="0"/>
-              <a:t>18.03.2022</a:t>
+              <a:t>10.04.2023</a:t>
             </a:fld>
             <a:endParaRPr lang="de-AT"/>
           </a:p>
@@ -12995,7 +13035,7 @@
           <a:p>
             <a:fld id="{00701009-9ECF-4181-90A1-5A0A499163F4}" type="datetimeFigureOut">
               <a:rPr lang="de-AT" smtClean="0"/>
-              <a:t>18.03.2022</a:t>
+              <a:t>10.04.2023</a:t>
             </a:fld>
             <a:endParaRPr lang="de-AT"/>
           </a:p>
@@ -13195,7 +13235,7 @@
           <a:p>
             <a:fld id="{00701009-9ECF-4181-90A1-5A0A499163F4}" type="datetimeFigureOut">
               <a:rPr lang="de-AT" smtClean="0"/>
-              <a:t>18.03.2022</a:t>
+              <a:t>10.04.2023</a:t>
             </a:fld>
             <a:endParaRPr lang="de-AT"/>
           </a:p>
@@ -13405,7 +13445,7 @@
           <a:p>
             <a:fld id="{00701009-9ECF-4181-90A1-5A0A499163F4}" type="datetimeFigureOut">
               <a:rPr lang="de-AT" smtClean="0"/>
-              <a:t>18.03.2022</a:t>
+              <a:t>10.04.2023</a:t>
             </a:fld>
             <a:endParaRPr lang="de-AT"/>
           </a:p>
@@ -13605,7 +13645,7 @@
           <a:p>
             <a:fld id="{00701009-9ECF-4181-90A1-5A0A499163F4}" type="datetimeFigureOut">
               <a:rPr lang="de-AT" smtClean="0"/>
-              <a:t>18.03.2022</a:t>
+              <a:t>10.04.2023</a:t>
             </a:fld>
             <a:endParaRPr lang="de-AT"/>
           </a:p>
@@ -13881,7 +13921,7 @@
           <a:p>
             <a:fld id="{00701009-9ECF-4181-90A1-5A0A499163F4}" type="datetimeFigureOut">
               <a:rPr lang="de-AT" smtClean="0"/>
-              <a:t>18.03.2022</a:t>
+              <a:t>10.04.2023</a:t>
             </a:fld>
             <a:endParaRPr lang="de-AT"/>
           </a:p>
@@ -14149,7 +14189,7 @@
           <a:p>
             <a:fld id="{00701009-9ECF-4181-90A1-5A0A499163F4}" type="datetimeFigureOut">
               <a:rPr lang="de-AT" smtClean="0"/>
-              <a:t>18.03.2022</a:t>
+              <a:t>10.04.2023</a:t>
             </a:fld>
             <a:endParaRPr lang="de-AT"/>
           </a:p>
@@ -14564,7 +14604,7 @@
           <a:p>
             <a:fld id="{00701009-9ECF-4181-90A1-5A0A499163F4}" type="datetimeFigureOut">
               <a:rPr lang="de-AT" smtClean="0"/>
-              <a:t>18.03.2022</a:t>
+              <a:t>10.04.2023</a:t>
             </a:fld>
             <a:endParaRPr lang="de-AT"/>
           </a:p>
@@ -14706,7 +14746,7 @@
           <a:p>
             <a:fld id="{00701009-9ECF-4181-90A1-5A0A499163F4}" type="datetimeFigureOut">
               <a:rPr lang="de-AT" smtClean="0"/>
-              <a:t>18.03.2022</a:t>
+              <a:t>10.04.2023</a:t>
             </a:fld>
             <a:endParaRPr lang="de-AT"/>
           </a:p>
@@ -14912,7 +14952,7 @@
           <a:p>
             <a:fld id="{00701009-9ECF-4181-90A1-5A0A499163F4}" type="datetimeFigureOut">
               <a:rPr lang="de-AT" smtClean="0"/>
-              <a:t>18.03.2022</a:t>
+              <a:t>10.04.2023</a:t>
             </a:fld>
             <a:endParaRPr lang="de-AT"/>
           </a:p>
@@ -15225,7 +15265,7 @@
           <a:p>
             <a:fld id="{00701009-9ECF-4181-90A1-5A0A499163F4}" type="datetimeFigureOut">
               <a:rPr lang="de-AT" smtClean="0"/>
-              <a:t>18.03.2022</a:t>
+              <a:t>10.04.2023</a:t>
             </a:fld>
             <a:endParaRPr lang="de-AT"/>
           </a:p>
@@ -15468,7 +15508,7 @@
           <a:p>
             <a:fld id="{00701009-9ECF-4181-90A1-5A0A499163F4}" type="datetimeFigureOut">
               <a:rPr lang="de-AT" smtClean="0"/>
-              <a:t>18.03.2022</a:t>
+              <a:t>10.04.2023</a:t>
             </a:fld>
             <a:endParaRPr lang="de-AT"/>
           </a:p>
@@ -16140,6 +16180,147 @@
           <p:cNvPr id="2" name="Titel 1">
             <a:extLst>
               <a:ext uri="{FF2B5EF4-FFF2-40B4-BE49-F238E27FC236}">
+                <a16:creationId xmlns:a16="http://schemas.microsoft.com/office/drawing/2014/main" id="{568DEAF1-7336-79AF-9058-50A7E8A6D001}"/>
+              </a:ext>
+            </a:extLst>
+          </p:cNvPr>
+          <p:cNvSpPr>
+            <a:spLocks noGrp="1"/>
+          </p:cNvSpPr>
+          <p:nvPr>
+            <p:ph type="title"/>
+          </p:nvPr>
+        </p:nvSpPr>
+        <p:spPr/>
+        <p:txBody>
+          <a:bodyPr/>
+          <a:lstStyle/>
+          <a:p>
+            <a:r>
+              <a:rPr lang="en-US" dirty="0"/>
+              <a:t>OWASP Cheat Sheet Series</a:t>
+            </a:r>
+          </a:p>
+        </p:txBody>
+      </p:sp>
+      <p:pic>
+        <p:nvPicPr>
+          <p:cNvPr id="1026" name="Picture 2" descr="ProjectLogoOfficial">
+            <a:extLst>
+              <a:ext uri="{FF2B5EF4-FFF2-40B4-BE49-F238E27FC236}">
+                <a16:creationId xmlns:a16="http://schemas.microsoft.com/office/drawing/2014/main" id="{02E02A53-2A47-0385-B9EB-2F877DF723FF}"/>
+              </a:ext>
+            </a:extLst>
+          </p:cNvPr>
+          <p:cNvPicPr>
+            <a:picLocks noChangeAspect="1" noChangeArrowheads="1"/>
+          </p:cNvPicPr>
+          <p:nvPr/>
+        </p:nvPicPr>
+        <p:blipFill>
+          <a:blip r:embed="rId2">
+            <a:extLst>
+              <a:ext uri="{28A0092B-C50C-407E-A947-70E740481C1C}">
+                <a14:useLocalDpi xmlns:a14="http://schemas.microsoft.com/office/drawing/2010/main" val="0"/>
+              </a:ext>
+            </a:extLst>
+          </a:blip>
+          <a:srcRect/>
+          <a:stretch>
+            <a:fillRect/>
+          </a:stretch>
+        </p:blipFill>
+        <p:spPr bwMode="auto">
+          <a:xfrm>
+            <a:off x="3291288" y="1571778"/>
+            <a:ext cx="5753673" cy="4438548"/>
+          </a:xfrm>
+          <a:prstGeom prst="rect">
+            <a:avLst/>
+          </a:prstGeom>
+          <a:noFill/>
+          <a:extLst>
+            <a:ext uri="{909E8E84-426E-40DD-AFC4-6F175D3DCCD1}">
+              <a14:hiddenFill xmlns:a14="http://schemas.microsoft.com/office/drawing/2010/main">
+                <a:solidFill>
+                  <a:srgbClr val="FFFFFF"/>
+                </a:solidFill>
+              </a14:hiddenFill>
+            </a:ext>
+          </a:extLst>
+        </p:spPr>
+      </p:pic>
+      <p:sp>
+        <p:nvSpPr>
+          <p:cNvPr id="5" name="Textfeld 4">
+            <a:extLst>
+              <a:ext uri="{FF2B5EF4-FFF2-40B4-BE49-F238E27FC236}">
+                <a16:creationId xmlns:a16="http://schemas.microsoft.com/office/drawing/2014/main" id="{D24E9FFC-ADC4-5E26-E756-71EA01C541C6}"/>
+              </a:ext>
+            </a:extLst>
+          </p:cNvPr>
+          <p:cNvSpPr txBox="1"/>
+          <p:nvPr/>
+        </p:nvSpPr>
+        <p:spPr>
+          <a:xfrm>
+            <a:off x="173118" y="6165897"/>
+            <a:ext cx="11845761" cy="369332"/>
+          </a:xfrm>
+          <a:prstGeom prst="rect">
+            <a:avLst/>
+          </a:prstGeom>
+          <a:noFill/>
+        </p:spPr>
+        <p:txBody>
+          <a:bodyPr wrap="square" rtlCol="0">
+            <a:spAutoFit/>
+          </a:bodyPr>
+          <a:lstStyle/>
+          <a:p>
+            <a:pPr algn="ctr"/>
+            <a:r>
+              <a:rPr lang="de-DE" dirty="0"/>
+              <a:t>https://cheatsheetseries.owasp.org/</a:t>
+            </a:r>
+          </a:p>
+        </p:txBody>
+      </p:sp>
+    </p:spTree>
+    <p:extLst>
+      <p:ext uri="{BB962C8B-B14F-4D97-AF65-F5344CB8AC3E}">
+        <p14:creationId xmlns:p14="http://schemas.microsoft.com/office/powerpoint/2010/main" val="4186641867"/>
+      </p:ext>
+    </p:extLst>
+  </p:cSld>
+  <p:clrMapOvr>
+    <a:masterClrMapping/>
+  </p:clrMapOvr>
+</p:sld>
+</file>
+
+<file path=ppt/slides/slide12.xml><?xml version="1.0" encoding="utf-8"?>
+<p:sld xmlns:a="http://schemas.openxmlformats.org/drawingml/2006/main" xmlns:r="http://schemas.openxmlformats.org/officeDocument/2006/relationships" xmlns:p="http://schemas.openxmlformats.org/presentationml/2006/main">
+  <p:cSld>
+    <p:spTree>
+      <p:nvGrpSpPr>
+        <p:cNvPr id="1" name=""/>
+        <p:cNvGrpSpPr/>
+        <p:nvPr/>
+      </p:nvGrpSpPr>
+      <p:grpSpPr>
+        <a:xfrm>
+          <a:off x="0" y="0"/>
+          <a:ext cx="0" cy="0"/>
+          <a:chOff x="0" y="0"/>
+          <a:chExt cx="0" cy="0"/>
+        </a:xfrm>
+      </p:grpSpPr>
+      <p:sp>
+        <p:nvSpPr>
+          <p:cNvPr id="2" name="Titel 1">
+            <a:extLst>
+              <a:ext uri="{FF2B5EF4-FFF2-40B4-BE49-F238E27FC236}">
                 <a16:creationId xmlns:a16="http://schemas.microsoft.com/office/drawing/2014/main" id="{5E59BA24-DB51-435B-82D3-69A5E46115C2}"/>
               </a:ext>
             </a:extLst>
@@ -16366,7 +16547,7 @@
 </p:sld>
 </file>
 
-<file path=ppt/slides/slide12.xml><?xml version="1.0" encoding="utf-8"?>
+<file path=ppt/slides/slide13.xml><?xml version="1.0" encoding="utf-8"?>
 <p:sld xmlns:a="http://schemas.openxmlformats.org/drawingml/2006/main" xmlns:r="http://schemas.openxmlformats.org/officeDocument/2006/relationships" xmlns:p="http://schemas.openxmlformats.org/presentationml/2006/main">
   <p:cSld>
     <p:spTree>

</xml_diff>